<commit_message>
Corrected example that treated [1..] as ones.
</commit_message>
<xml_diff>
--- a/slides/Chapter11.pptx
+++ b/slides/Chapter11.pptx
@@ -216,7 +216,7 @@
           <a:p>
             <a:fld id="{45A68BDD-2763-4CE5-A73B-034891CD5961}" type="datetimeFigureOut">
               <a:rPr lang="nl-NL" smtClean="0"/>
-              <a:t>9/2/14</a:t>
+              <a:t>28/11/14</a:t>
             </a:fld>
             <a:endParaRPr lang="nl-NL"/>
           </a:p>
@@ -1642,7 +1642,7 @@
             <a:fld id="{EB9CE284-6B6E-3744-B4AD-483F0080AEF9}" type="datetimeFigureOut">
               <a:rPr lang="nl-NL" smtClean="0"/>
               <a:pPr/>
-              <a:t>9/2/14</a:t>
+              <a:t>28/11/14</a:t>
             </a:fld>
             <a:endParaRPr lang="nl-NL"/>
           </a:p>
@@ -4258,6 +4258,99 @@
               </a:rPr>
               <a:t>=</a:t>
             </a:r>
+          </a:p>
+          <a:p>
+            <a:r>
+              <a:rPr lang="en-US" sz="2000" dirty="0">
+                <a:solidFill>
+                  <a:srgbClr val="000000"/>
+                </a:solidFill>
+                <a:latin typeface="Lucida Sans Typewriter" charset="0"/>
+              </a:rPr>
+              <a:t> </a:t>
+            </a:r>
+            <a:r>
+              <a:rPr lang="en-US" sz="2000" dirty="0" smtClean="0">
+                <a:solidFill>
+                  <a:srgbClr val="000000"/>
+                </a:solidFill>
+                <a:latin typeface="Lucida Sans Typewriter" charset="0"/>
+              </a:rPr>
+              <a:t>(</a:t>
+            </a:r>
+            <a:r>
+              <a:rPr lang="en-US" sz="2000" dirty="0" smtClean="0">
+                <a:solidFill>
+                  <a:srgbClr val="000000"/>
+                </a:solidFill>
+                <a:latin typeface="Wingdings"/>
+                <a:ea typeface="Wingdings"/>
+                <a:cs typeface="Wingdings"/>
+                <a:sym typeface="Wingdings"/>
+              </a:rPr>
+              <a:t></a:t>
+            </a:r>
+            <a:r>
+              <a:rPr lang="en-US" sz="2000" dirty="0" smtClean="0">
+                <a:solidFill>
+                  <a:srgbClr val="000000"/>
+                </a:solidFill>
+                <a:latin typeface="Lucida Sans Typewriter"/>
+                <a:ea typeface="Wingdings"/>
+                <a:cs typeface="Lucida Sans Typewriter"/>
+                <a:sym typeface="Wingdings"/>
+              </a:rPr>
+              <a:t> </a:t>
+            </a:r>
+            <a:r>
+              <a:rPr lang="en-US" sz="2000" dirty="0" smtClean="0">
+                <a:solidFill>
+                  <a:srgbClr val="000000"/>
+                </a:solidFill>
+                <a:latin typeface="Lucida Sans Typewriter"/>
+                <a:cs typeface="Lucida Sans Typewriter"/>
+              </a:rPr>
+              <a:t>* </a:t>
+            </a:r>
+            <a:r>
+              <a:rPr lang="en-US" sz="2000" dirty="0" smtClean="0">
+                <a:solidFill>
+                  <a:srgbClr val="000000"/>
+                </a:solidFill>
+                <a:latin typeface="Wingdings"/>
+                <a:ea typeface="Wingdings"/>
+                <a:cs typeface="Wingdings"/>
+                <a:sym typeface="Wingdings"/>
+              </a:rPr>
+              <a:t></a:t>
+            </a:r>
+            <a:r>
+              <a:rPr lang="en-US" sz="2000" dirty="0" smtClean="0">
+                <a:solidFill>
+                  <a:srgbClr val="000000"/>
+                </a:solidFill>
+                <a:latin typeface="Lucida Sans Typewriter" charset="0"/>
+              </a:rPr>
+              <a:t>)    (</a:t>
+            </a:r>
+            <a:r>
+              <a:rPr lang="en-US" sz="2000" u="sng" dirty="0">
+                <a:solidFill>
+                  <a:srgbClr val="000000"/>
+                </a:solidFill>
+                <a:latin typeface="Lucida Sans Typewriter" charset="0"/>
+              </a:rPr>
+              <a:t>3 + 4</a:t>
+            </a:r>
+            <a:r>
+              <a:rPr lang="en-US" sz="2000" dirty="0">
+                <a:solidFill>
+                  <a:srgbClr val="000000"/>
+                </a:solidFill>
+                <a:latin typeface="Lucida Sans Typewriter" charset="0"/>
+              </a:rPr>
+              <a:t>)</a:t>
+            </a:r>
             <a:endParaRPr lang="en-US" sz="2000" dirty="0" smtClean="0">
               <a:solidFill>
                 <a:srgbClr val="000000"/>
@@ -4267,25 +4360,27 @@
           </a:p>
           <a:p>
             <a:r>
+              <a:rPr lang="en-US" sz="2000" dirty="0" smtClean="0">
+                <a:solidFill>
+                  <a:srgbClr val="000000"/>
+                </a:solidFill>
+                <a:latin typeface="Lucida Sans Typewriter" charset="0"/>
+              </a:rPr>
+              <a:t>=</a:t>
+            </a:r>
+          </a:p>
+          <a:p>
+            <a:r>
               <a:rPr lang="en-US" sz="2000" dirty="0">
                 <a:solidFill>
                   <a:srgbClr val="000000"/>
                 </a:solidFill>
                 <a:latin typeface="Lucida Sans Typewriter" charset="0"/>
               </a:rPr>
-              <a:t> </a:t>
-            </a:r>
-            <a:r>
-              <a:rPr lang="en-US" sz="2000" dirty="0" smtClean="0">
-                <a:solidFill>
-                  <a:srgbClr val="000000"/>
-                </a:solidFill>
-                <a:latin typeface="Lucida Sans Typewriter" charset="0"/>
-              </a:rPr>
-              <a:t>(</a:t>
-            </a:r>
-            <a:r>
-              <a:rPr lang="en-US" sz="2000" dirty="0" smtClean="0">
+              <a:t> (</a:t>
+            </a:r>
+            <a:r>
+              <a:rPr lang="en-US" sz="2000" dirty="0">
                 <a:solidFill>
                   <a:srgbClr val="000000"/>
                 </a:solidFill>
@@ -4297,7 +4392,7 @@
               <a:t></a:t>
             </a:r>
             <a:r>
-              <a:rPr lang="en-US" sz="2000" dirty="0" smtClean="0">
+              <a:rPr lang="en-US" sz="2000" dirty="0">
                 <a:solidFill>
                   <a:srgbClr val="000000"/>
                 </a:solidFill>
@@ -4309,7 +4404,7 @@
               <a:t> </a:t>
             </a:r>
             <a:r>
-              <a:rPr lang="en-US" sz="2000" dirty="0" smtClean="0">
+              <a:rPr lang="en-US" sz="2000" dirty="0">
                 <a:solidFill>
                   <a:srgbClr val="000000"/>
                 </a:solidFill>
@@ -4319,7 +4414,7 @@
               <a:t>* </a:t>
             </a:r>
             <a:r>
-              <a:rPr lang="en-US" sz="2000" dirty="0" smtClean="0">
+              <a:rPr lang="en-US" sz="2000" dirty="0">
                 <a:solidFill>
                   <a:srgbClr val="000000"/>
                 </a:solidFill>
@@ -4337,124 +4432,8 @@
                 </a:solidFill>
                 <a:latin typeface="Lucida Sans Typewriter" charset="0"/>
               </a:rPr>
-              <a:t>)    (</a:t>
-            </a:r>
-            <a:r>
-              <a:rPr lang="en-US" sz="2000" u="sng" dirty="0">
-                <a:solidFill>
-                  <a:srgbClr val="000000"/>
-                </a:solidFill>
-                <a:latin typeface="Lucida Sans Typewriter" charset="0"/>
-              </a:rPr>
-              <a:t>3 + 4</a:t>
-            </a:r>
-            <a:r>
-              <a:rPr lang="en-US" sz="2000" dirty="0">
-                <a:solidFill>
-                  <a:srgbClr val="000000"/>
-                </a:solidFill>
-                <a:latin typeface="Lucida Sans Typewriter" charset="0"/>
-              </a:rPr>
-              <a:t>)</a:t>
-            </a:r>
-            <a:endParaRPr lang="en-US" sz="2000" dirty="0" smtClean="0">
-              <a:solidFill>
-                <a:srgbClr val="000000"/>
-              </a:solidFill>
-              <a:latin typeface="Lucida Sans Typewriter" charset="0"/>
-            </a:endParaRPr>
-          </a:p>
-          <a:p>
-            <a:r>
-              <a:rPr lang="en-US" sz="2000" dirty="0" smtClean="0">
-                <a:solidFill>
-                  <a:srgbClr val="000000"/>
-                </a:solidFill>
-                <a:latin typeface="Lucida Sans Typewriter" charset="0"/>
-              </a:rPr>
-              <a:t>=</a:t>
-            </a:r>
-          </a:p>
-          <a:p>
-            <a:r>
-              <a:rPr lang="en-US" sz="2000" dirty="0">
-                <a:solidFill>
-                  <a:srgbClr val="000000"/>
-                </a:solidFill>
-                <a:latin typeface="Lucida Sans Typewriter" charset="0"/>
-              </a:rPr>
-              <a:t> </a:t>
-            </a:r>
-            <a:r>
-              <a:rPr lang="en-US" sz="2000" dirty="0">
-                <a:solidFill>
-                  <a:srgbClr val="000000"/>
-                </a:solidFill>
-                <a:latin typeface="Lucida Sans Typewriter" charset="0"/>
-              </a:rPr>
-              <a:t>(</a:t>
-            </a:r>
-            <a:r>
-              <a:rPr lang="en-US" sz="2000" dirty="0">
-                <a:solidFill>
-                  <a:srgbClr val="000000"/>
-                </a:solidFill>
-                <a:latin typeface="Wingdings"/>
-                <a:ea typeface="Wingdings"/>
-                <a:cs typeface="Wingdings"/>
-                <a:sym typeface="Wingdings"/>
-              </a:rPr>
-              <a:t></a:t>
-            </a:r>
-            <a:r>
-              <a:rPr lang="en-US" sz="2000" dirty="0">
-                <a:solidFill>
-                  <a:srgbClr val="000000"/>
-                </a:solidFill>
-                <a:latin typeface="Lucida Sans Typewriter"/>
-                <a:ea typeface="Wingdings"/>
-                <a:cs typeface="Lucida Sans Typewriter"/>
-                <a:sym typeface="Wingdings"/>
-              </a:rPr>
-              <a:t> </a:t>
-            </a:r>
-            <a:r>
-              <a:rPr lang="en-US" sz="2000" dirty="0">
-                <a:solidFill>
-                  <a:srgbClr val="000000"/>
-                </a:solidFill>
-                <a:latin typeface="Lucida Sans Typewriter"/>
-                <a:cs typeface="Lucida Sans Typewriter"/>
-              </a:rPr>
-              <a:t>* </a:t>
-            </a:r>
-            <a:r>
-              <a:rPr lang="en-US" sz="2000" dirty="0">
-                <a:solidFill>
-                  <a:srgbClr val="000000"/>
-                </a:solidFill>
-                <a:latin typeface="Wingdings"/>
-                <a:ea typeface="Wingdings"/>
-                <a:cs typeface="Wingdings"/>
-                <a:sym typeface="Wingdings"/>
-              </a:rPr>
-              <a:t></a:t>
-            </a:r>
-            <a:r>
-              <a:rPr lang="en-US" sz="2000" dirty="0" smtClean="0">
-                <a:solidFill>
-                  <a:srgbClr val="000000"/>
-                </a:solidFill>
-                <a:latin typeface="Lucida Sans Typewriter" charset="0"/>
-              </a:rPr>
               <a:t>)       7</a:t>
             </a:r>
-            <a:endParaRPr lang="en-US" sz="2000" dirty="0" smtClean="0">
-              <a:solidFill>
-                <a:srgbClr val="000000"/>
-              </a:solidFill>
-              <a:latin typeface="Lucida Sans Typewriter" charset="0"/>
-            </a:endParaRPr>
           </a:p>
           <a:p>
             <a:r>
@@ -7009,12 +6988,6 @@
               </a:rPr>
               <a:t>		  = ...</a:t>
             </a:r>
-            <a:endParaRPr lang="en-US" sz="2200" dirty="0" smtClean="0">
-              <a:solidFill>
-                <a:srgbClr val="000000"/>
-              </a:solidFill>
-              <a:latin typeface="Lucida Sans Typewriter" charset="0"/>
-            </a:endParaRPr>
           </a:p>
         </p:txBody>
       </p:sp>
@@ -7360,12 +7333,6 @@
               </a:rPr>
               <a:t>		  = 1</a:t>
             </a:r>
-            <a:endParaRPr lang="en-US" sz="2200" dirty="0" smtClean="0">
-              <a:solidFill>
-                <a:srgbClr val="000000"/>
-              </a:solidFill>
-              <a:latin typeface="Lucida Sans Typewriter" charset="0"/>
-            </a:endParaRPr>
           </a:p>
         </p:txBody>
       </p:sp>
@@ -8476,7 +8443,7 @@
                 <a:latin typeface="Lucida Sans Typewriter"/>
                 <a:cs typeface="Lucida Sans Typewriter"/>
               </a:rPr>
-              <a:t>[1,1,1,1,1</a:t>
+              <a:t>[</a:t>
             </a:r>
             <a:r>
               <a:rPr lang="en-US" sz="2000" dirty="0" smtClean="0">
@@ -8486,7 +8453,7 @@
                 <a:latin typeface="Lucida Sans Typewriter"/>
                 <a:cs typeface="Lucida Sans Typewriter"/>
               </a:rPr>
-              <a:t>]</a:t>
+              <a:t>1,2,3,4,5]</a:t>
             </a:r>
             <a:endParaRPr lang="en-US" sz="2000" dirty="0">
               <a:solidFill>
@@ -8660,13 +8627,7 @@
               <a:rPr lang="en-US" sz="1900" dirty="0" smtClean="0">
                 <a:latin typeface="Lucida Sans Typewriter" charset="0"/>
               </a:rPr>
-              <a:t>c</a:t>
-            </a:r>
-            <a:r>
-              <a:rPr lang="en-US" sz="1900" dirty="0" smtClean="0">
-                <a:latin typeface="Lucida Sans Typewriter" charset="0"/>
-              </a:rPr>
-              <a:t>ontrol  data</a:t>
+              <a:t>control  data</a:t>
             </a:r>
           </a:p>
         </p:txBody>
@@ -12198,27 +12159,7 @@
                 <a:latin typeface="Lucida Sans Typewriter"/>
                 <a:cs typeface="Lucida Sans Typewriter"/>
               </a:rPr>
-              <a:t>? take </a:t>
-            </a:r>
-            <a:r>
-              <a:rPr lang="en-US" sz="2000" dirty="0" smtClean="0">
-                <a:solidFill>
-                  <a:srgbClr val="000000"/>
-                </a:solidFill>
-                <a:latin typeface="Lucida Sans Typewriter"/>
-                <a:cs typeface="Lucida Sans Typewriter"/>
-              </a:rPr>
-              <a:t>10</a:t>
-            </a:r>
-            <a:r>
-              <a:rPr lang="en-US" sz="2000" dirty="0" smtClean="0">
-                <a:solidFill>
-                  <a:srgbClr val="000000"/>
-                </a:solidFill>
-                <a:latin typeface="Lucida Sans Typewriter"/>
-                <a:cs typeface="Lucida Sans Typewriter"/>
-              </a:rPr>
-              <a:t> primes</a:t>
+              <a:t>? take 10 primes</a:t>
             </a:r>
           </a:p>
           <a:p>
@@ -12602,27 +12543,7 @@
                 <a:latin typeface="Lucida Sans Typewriter"/>
                 <a:cs typeface="Lucida Sans Typewriter"/>
               </a:rPr>
-              <a:t> </a:t>
-            </a:r>
-            <a:r>
-              <a:rPr lang="en-US" sz="2000" dirty="0" smtClean="0">
-                <a:solidFill>
-                  <a:srgbClr val="000000"/>
-                </a:solidFill>
-                <a:latin typeface="Lucida Sans Typewriter"/>
-                <a:cs typeface="Lucida Sans Typewriter"/>
-              </a:rPr>
-              <a:t>(&lt;15)</a:t>
-            </a:r>
-            <a:r>
-              <a:rPr lang="en-US" sz="2000" dirty="0" smtClean="0">
-                <a:solidFill>
-                  <a:srgbClr val="000000"/>
-                </a:solidFill>
-                <a:latin typeface="Lucida Sans Typewriter"/>
-                <a:cs typeface="Lucida Sans Typewriter"/>
-              </a:rPr>
-              <a:t> primes</a:t>
+              <a:t> (&lt;15) primes</a:t>
             </a:r>
           </a:p>
           <a:p>
@@ -13758,17 +13679,7 @@
                 <a:latin typeface="Lucida Sans Typewriter"/>
                 <a:cs typeface="Lucida Sans Typewriter"/>
               </a:rPr>
-              <a:t>f</a:t>
-            </a:r>
-            <a:r>
-              <a:rPr lang="en-US" sz="2000" dirty="0" smtClean="0">
-                <a:solidFill>
-                  <a:srgbClr val="000000"/>
-                </a:solidFill>
-                <a:latin typeface="Lucida Sans Typewriter"/>
-                <a:cs typeface="Lucida Sans Typewriter"/>
-              </a:rPr>
-              <a:t>ib :: </a:t>
+              <a:t>fib :: </a:t>
             </a:r>
             <a:r>
               <a:rPr lang="en-US" sz="2000" dirty="0" err="1" smtClean="0">

</xml_diff>